<commit_message>
aulas ppt Arq de Comput
</commit_message>
<xml_diff>
--- a/01 Classes/Aula4 - Arquitetura - Memória Secundária.pptx
+++ b/01 Classes/Aula4 - Arquitetura - Memória Secundária.pptx
@@ -302,7 +302,7 @@
       </p15:sldGuideLst>
     </p:ext>
     <p:ext uri="http://customooxmlschemas.google.com/">
-      <go:slidesCustomData xmlns="" xmlns:mc="http://schemas.openxmlformats.org/markup-compatibility/2006" xmlns:mv="urn:schemas-microsoft-com:mac:vml" xmlns:c="http://schemas.openxmlformats.org/drawingml/2006/chart" xmlns:dgm="http://schemas.openxmlformats.org/drawingml/2006/diagram" xmlns:o="urn:schemas-microsoft-com:office:office" xmlns:v="urn:schemas-microsoft-com:vml" xmlns:pvml="urn:schemas-microsoft-com:office:powerpoint" xmlns:com="http://schemas.openxmlformats.org/drawingml/2006/compatibility" xmlns:p14="http://schemas.microsoft.com/office/powerpoint/2010/main" xmlns:p15="http://schemas.microsoft.com/office/powerpoint/2012/main" xmlns:ahyp="http://schemas.microsoft.com/office/drawing/2018/hyperlinkcolor" xmlns:go="http://customooxmlschemas.google.com/" r:id="rId49" roundtripDataSignature="AMtx7miAiLrPbT3ci0Tlw/hHFb0dnYspjQ=="/>
+      <go:slidesCustomData xmlns:go="http://customooxmlschemas.google.com/" xmlns:ahyp="http://schemas.microsoft.com/office/drawing/2018/hyperlinkcolor" xmlns:p15="http://schemas.microsoft.com/office/powerpoint/2012/main" xmlns:p14="http://schemas.microsoft.com/office/powerpoint/2010/main" xmlns:com="http://schemas.openxmlformats.org/drawingml/2006/compatibility" xmlns:pvml="urn:schemas-microsoft-com:office:powerpoint" xmlns:v="urn:schemas-microsoft-com:vml" xmlns:o="urn:schemas-microsoft-com:office:office" xmlns:dgm="http://schemas.openxmlformats.org/drawingml/2006/diagram" xmlns:c="http://schemas.openxmlformats.org/drawingml/2006/chart" xmlns:mv="urn:schemas-microsoft-com:mac:vml" xmlns:mc="http://schemas.openxmlformats.org/markup-compatibility/2006" xmlns="" r:id="rId49" roundtripDataSignature="AMtx7miAiLrPbT3ci0Tlw/hHFb0dnYspjQ=="/>
     </p:ext>
   </p:extLst>
 </p:presentation>
@@ -25171,13 +25171,165 @@
         </p:nvSpPr>
         <p:spPr>
           <a:xfrm>
-            <a:off x="611560" y="1431453"/>
-            <a:ext cx="7632848" cy="3941763"/>
+            <a:off x="611560" y="1043608"/>
+            <a:ext cx="7632848" cy="5672197"/>
           </a:xfrm>
         </p:spPr>
         <p:txBody>
-          <a:bodyPr/>
+          <a:bodyPr>
+            <a:normAutofit/>
+          </a:bodyPr>
           <a:lstStyle/>
+          <a:p>
+            <a:r>
+              <a:rPr lang="pt-BR" sz="2200" b="1" dirty="0"/>
+              <a:t>Semicondutores: </a:t>
+            </a:r>
+            <a:r>
+              <a:rPr lang="pt-BR" sz="2200" b="1" dirty="0">
+                <a:solidFill>
+                  <a:srgbClr val="FF0000"/>
+                </a:solidFill>
+              </a:rPr>
+              <a:t>Silício; Germânio; </a:t>
+            </a:r>
+            <a:r>
+              <a:rPr lang="pt-BR" sz="2200" b="1" dirty="0" err="1">
+                <a:solidFill>
+                  <a:srgbClr val="FF0000"/>
+                </a:solidFill>
+              </a:rPr>
+              <a:t>Arseneto</a:t>
+            </a:r>
+            <a:r>
+              <a:rPr lang="pt-BR" sz="2200" b="1" dirty="0">
+                <a:solidFill>
+                  <a:srgbClr val="FF0000"/>
+                </a:solidFill>
+              </a:rPr>
+              <a:t>; </a:t>
+            </a:r>
+            <a:r>
+              <a:rPr lang="pt-BR" sz="2200" b="1" dirty="0">
+                <a:solidFill>
+                  <a:srgbClr val="0070C0"/>
+                </a:solidFill>
+              </a:rPr>
+              <a:t>Grafeno</a:t>
+            </a:r>
+          </a:p>
+          <a:p>
+            <a:r>
+              <a:rPr lang="pt-BR" sz="2200" b="1" dirty="0"/>
+              <a:t>Memória RAM e Virtual:  </a:t>
+            </a:r>
+            <a:r>
+              <a:rPr lang="pt-BR" sz="2200" b="1" dirty="0">
+                <a:solidFill>
+                  <a:srgbClr val="FF0000"/>
+                </a:solidFill>
+              </a:rPr>
+              <a:t>Paginação e Segmentação</a:t>
+            </a:r>
+          </a:p>
+          <a:p>
+            <a:pPr marL="114300" indent="0">
+              <a:buNone/>
+            </a:pPr>
+            <a:r>
+              <a:rPr lang="pt-BR" sz="2200" dirty="0"/>
+              <a:t>	</a:t>
+            </a:r>
+            <a:r>
+              <a:rPr lang="pt-BR" sz="2200" dirty="0">
+                <a:hlinkClick r:id="rId2"/>
+              </a:rPr>
+              <a:t>https://youtu.be/zI8e3Gu7APg</a:t>
+            </a:r>
+            <a:endParaRPr lang="pt-BR" sz="2200" dirty="0"/>
+          </a:p>
+          <a:p>
+            <a:r>
+              <a:rPr lang="pt-BR" sz="2200" b="1" dirty="0" err="1"/>
+              <a:t>DIMMs</a:t>
+            </a:r>
+            <a:r>
+              <a:rPr lang="pt-BR" sz="2200" b="1" dirty="0"/>
+              <a:t> (módulos de </a:t>
+            </a:r>
+            <a:r>
+              <a:rPr lang="pt-BR" sz="2200" b="1" dirty="0">
+                <a:solidFill>
+                  <a:srgbClr val="FF0000"/>
+                </a:solidFill>
+              </a:rPr>
+              <a:t>memória de desktop</a:t>
+            </a:r>
+            <a:r>
+              <a:rPr lang="pt-BR" sz="2200" b="1" dirty="0"/>
+              <a:t>) e </a:t>
+            </a:r>
+            <a:r>
+              <a:rPr lang="pt-BR" sz="2200" b="1" dirty="0" err="1"/>
+              <a:t>SODIMMs</a:t>
+            </a:r>
+            <a:r>
+              <a:rPr lang="pt-BR" sz="2200" b="1" dirty="0"/>
+              <a:t> (módulos de </a:t>
+            </a:r>
+            <a:r>
+              <a:rPr lang="pt-BR" sz="2200" b="1" dirty="0">
+                <a:solidFill>
+                  <a:srgbClr val="FF0000"/>
+                </a:solidFill>
+              </a:rPr>
+              <a:t>memória de laptop</a:t>
+            </a:r>
+            <a:r>
+              <a:rPr lang="pt-BR" sz="2200" b="1" dirty="0"/>
+              <a:t>)</a:t>
+            </a:r>
+          </a:p>
+          <a:p>
+            <a:r>
+              <a:rPr lang="pt-BR" sz="2200" b="1" dirty="0"/>
+              <a:t>BIOS/POST/SETUP/CMOS/BATERIA/BOOT:</a:t>
+            </a:r>
+            <a:r>
+              <a:rPr lang="pt-BR" sz="2200" b="1" dirty="0">
+                <a:solidFill>
+                  <a:srgbClr val="FF0000"/>
+                </a:solidFill>
+              </a:rPr>
+              <a:t>MBR;GPT</a:t>
+            </a:r>
+            <a:endParaRPr lang="pt-BR" sz="2200" b="1" dirty="0"/>
+          </a:p>
+          <a:p>
+            <a:pPr marL="114300" indent="0">
+              <a:buNone/>
+            </a:pPr>
+            <a:r>
+              <a:rPr lang="pt-BR" sz="2200" dirty="0"/>
+              <a:t>	</a:t>
+            </a:r>
+            <a:r>
+              <a:rPr lang="pt-BR" sz="2200" dirty="0">
+                <a:hlinkClick r:id="rId3"/>
+              </a:rPr>
+              <a:t>https://homepages.dcc.ufmg.br/~cesarfmc/classes/manut2/TeoricaSetup.pdf</a:t>
+            </a:r>
+            <a:r>
+              <a:rPr lang="pt-BR" sz="2200" dirty="0"/>
+              <a:t> </a:t>
+            </a:r>
+          </a:p>
+          <a:p>
+            <a:r>
+              <a:rPr lang="pt-BR" sz="2200" b="1" dirty="0"/>
+              <a:t>Memória Soldada</a:t>
+            </a:r>
+          </a:p>
           <a:p>
             <a:r>
               <a:rPr lang="pt-BR" sz="2200" dirty="0"/>
@@ -25216,13 +25368,8 @@
             <a:pPr lvl="1"/>
             <a:r>
               <a:rPr lang="pt-BR" sz="1600" dirty="0"/>
-              <a:t>Técnicas de </a:t>
-            </a:r>
-            <a:r>
-              <a:rPr lang="pt-BR" sz="1600"/>
-              <a:t>acesso ao disco</a:t>
-            </a:r>
-            <a:endParaRPr lang="pt-BR" sz="1600" dirty="0"/>
+              <a:t>Técnicas de acesso ao disco</a:t>
+            </a:r>
           </a:p>
         </p:txBody>
       </p:sp>
@@ -25406,7 +25553,7 @@
           <p:nvPr/>
         </p:nvPicPr>
         <p:blipFill rotWithShape="1">
-          <a:blip r:embed="rId2">
+          <a:blip r:embed="rId4">
             <a:alphaModFix/>
           </a:blip>
           <a:srcRect/>

</xml_diff>

<commit_message>
Disciplina Arq de Comp 28Mar2025
</commit_message>
<xml_diff>
--- a/01 Classes/Aula4 - Arquitetura - Memória Secundária.pptx
+++ b/01 Classes/Aula4 - Arquitetura - Memória Secundária.pptx
@@ -302,7 +302,7 @@
       </p15:sldGuideLst>
     </p:ext>
     <p:ext uri="http://customooxmlschemas.google.com/">
-      <go:slidesCustomData xmlns:go="http://customooxmlschemas.google.com/" xmlns:ahyp="http://schemas.microsoft.com/office/drawing/2018/hyperlinkcolor" xmlns:p15="http://schemas.microsoft.com/office/powerpoint/2012/main" xmlns:p14="http://schemas.microsoft.com/office/powerpoint/2010/main" xmlns:com="http://schemas.openxmlformats.org/drawingml/2006/compatibility" xmlns:pvml="urn:schemas-microsoft-com:office:powerpoint" xmlns:v="urn:schemas-microsoft-com:vml" xmlns:o="urn:schemas-microsoft-com:office:office" xmlns:dgm="http://schemas.openxmlformats.org/drawingml/2006/diagram" xmlns:c="http://schemas.openxmlformats.org/drawingml/2006/chart" xmlns:mv="urn:schemas-microsoft-com:mac:vml" xmlns:mc="http://schemas.openxmlformats.org/markup-compatibility/2006" xmlns="" r:id="rId49" roundtripDataSignature="AMtx7miAiLrPbT3ci0Tlw/hHFb0dnYspjQ=="/>
+      <go:slidesCustomData xmlns="" xmlns:mc="http://schemas.openxmlformats.org/markup-compatibility/2006" xmlns:mv="urn:schemas-microsoft-com:mac:vml" xmlns:c="http://schemas.openxmlformats.org/drawingml/2006/chart" xmlns:dgm="http://schemas.openxmlformats.org/drawingml/2006/diagram" xmlns:o="urn:schemas-microsoft-com:office:office" xmlns:v="urn:schemas-microsoft-com:vml" xmlns:pvml="urn:schemas-microsoft-com:office:powerpoint" xmlns:com="http://schemas.openxmlformats.org/drawingml/2006/compatibility" xmlns:p14="http://schemas.microsoft.com/office/powerpoint/2010/main" xmlns:p15="http://schemas.microsoft.com/office/powerpoint/2012/main" xmlns:ahyp="http://schemas.microsoft.com/office/drawing/2018/hyperlinkcolor" xmlns:go="http://customooxmlschemas.google.com/" r:id="rId49" roundtripDataSignature="AMtx7miAiLrPbT3ci0Tlw/hHFb0dnYspjQ=="/>
     </p:ext>
   </p:extLst>
 </p:presentation>
@@ -25292,8 +25292,16 @@
           </a:p>
           <a:p>
             <a:r>
+              <a:rPr lang="pt-BR" sz="2200" b="1" dirty="0">
+                <a:solidFill>
+                  <a:srgbClr val="002060"/>
+                </a:solidFill>
+              </a:rPr>
+              <a:t>BIOS</a:t>
+            </a:r>
+            <a:r>
               <a:rPr lang="pt-BR" sz="2200" b="1" dirty="0"/>
-              <a:t>BIOS/POST/SETUP/CMOS/BATERIA/BOOT:</a:t>
+              <a:t>/POST/SETUP/CMOS/</a:t>
             </a:r>
             <a:r>
               <a:rPr lang="pt-BR" sz="2200" b="1" dirty="0">
@@ -25301,17 +25309,31 @@
                   <a:srgbClr val="FF0000"/>
                 </a:solidFill>
               </a:rPr>
-              <a:t>MBR;GPT</a:t>
-            </a:r>
-            <a:endParaRPr lang="pt-BR" sz="2200" b="1" dirty="0"/>
-          </a:p>
-          <a:p>
-            <a:pPr marL="114300" indent="0">
-              <a:buNone/>
-            </a:pPr>
-            <a:r>
-              <a:rPr lang="pt-BR" sz="2200" dirty="0"/>
-              <a:t>	</a:t>
+              <a:t> </a:t>
+            </a:r>
+            <a:r>
+              <a:rPr lang="pt-BR" sz="2200" b="1" dirty="0" err="1"/>
+              <a:t>bootloader</a:t>
+            </a:r>
+            <a:r>
+              <a:rPr lang="pt-BR" sz="2200" b="1" dirty="0">
+                <a:solidFill>
+                  <a:srgbClr val="FF0000"/>
+                </a:solidFill>
+              </a:rPr>
+              <a:t>/BOOT</a:t>
+            </a:r>
+            <a:r>
+              <a:rPr lang="pt-BR" sz="2200" b="1" dirty="0"/>
+              <a:t>:</a:t>
+            </a:r>
+            <a:r>
+              <a:rPr lang="pt-BR" sz="2200" b="1" dirty="0">
+                <a:solidFill>
+                  <a:srgbClr val="FF0000"/>
+                </a:solidFill>
+              </a:rPr>
+              <a:t>MBR;GPT; </a:t>
             </a:r>
             <a:r>
               <a:rPr lang="pt-BR" sz="2200" dirty="0">

</xml_diff>